<commit_message>
cleaned up the presentation file for the first review by all
</commit_message>
<xml_diff>
--- a/Docs/60_Projektabschluss/Abschluss_Praesentation_mit_Bildern.pptx
+++ b/Docs/60_Projektabschluss/Abschluss_Praesentation_mit_Bildern.pptx
@@ -133,7 +133,7 @@
   </p:defaultTextStyle>
   <p:extLst>
     <p:ext uri="{EFAFB233-063F-42B5-8137-9DF3F51BA10A}">
-      <p15:sldGuideLst xmlns:p15="http://schemas.microsoft.com/office/powerpoint/2012/main" xmlns=""/>
+      <p15:sldGuideLst xmlns="" xmlns:p15="http://schemas.microsoft.com/office/powerpoint/2012/main"/>
     </p:ext>
   </p:extLst>
 </p:presentation>
@@ -5078,7 +5078,7 @@
                   <a:srgbClr val="000000"/>
                 </a:solidFill>
               </a:rPr>
-              <a:t>Allergiegruppe)</a:t>
+              <a:t>Kategorien)</a:t>
             </a:r>
             <a:endParaRPr lang="de-DE" dirty="0" smtClean="0"/>
           </a:p>
@@ -5287,7 +5287,7 @@
               <a:t> </a:t>
             </a:r>
             <a:r>
-              <a:rPr lang="en-US" dirty="0">
+              <a:rPr lang="en-US">
                 <a:solidFill>
                   <a:srgbClr val="000000"/>
                 </a:solidFill>
@@ -5295,28 +5295,12 @@
               <a:t>in </a:t>
             </a:r>
             <a:r>
-              <a:rPr lang="en-US" dirty="0" err="1">
+              <a:rPr lang="en-US" smtClean="0">
                 <a:solidFill>
                   <a:srgbClr val="000000"/>
                 </a:solidFill>
               </a:rPr>
-              <a:t>php</a:t>
-            </a:r>
-            <a:r>
-              <a:rPr lang="en-US" dirty="0">
-                <a:solidFill>
-                  <a:srgbClr val="000000"/>
-                </a:solidFill>
-              </a:rPr>
-              <a:t> </a:t>
-            </a:r>
-            <a:r>
-              <a:rPr lang="en-US" dirty="0" err="1" smtClean="0">
-                <a:solidFill>
-                  <a:srgbClr val="000000"/>
-                </a:solidFill>
-              </a:rPr>
-              <a:t>implementiert</a:t>
+              <a:t>PHP implementiert</a:t>
             </a:r>
             <a:endParaRPr lang="en-US" dirty="0" smtClean="0"/>
           </a:p>
@@ -12046,7 +12030,7 @@
   <a:extraClrSchemeLst/>
   <a:extLst>
     <a:ext uri="{05A4C25C-085E-4340-85A3-A5531E510DB2}">
-      <thm15:themeFamily xmlns:thm15="http://schemas.microsoft.com/office/thememl/2012/main" xmlns="" name="Office Theme" id="{62F939B6-93AF-4DB8-9C6B-D6C7DFDC589F}" vid="{4A3C46E8-61CC-4603-A589-7422A47A8E4A}"/>
+      <thm15:themeFamily xmlns="" xmlns:thm15="http://schemas.microsoft.com/office/thememl/2012/main" name="Office Theme" id="{62F939B6-93AF-4DB8-9C6B-D6C7DFDC589F}" vid="{4A3C46E8-61CC-4603-A589-7422A47A8E4A}"/>
     </a:ext>
   </a:extLst>
 </a:theme>

</xml_diff>